<commit_message>
updating slides when recording videos
</commit_message>
<xml_diff>
--- a/VideoSessionsMaterials/v2-setting-up.pptx
+++ b/VideoSessionsMaterials/v2-setting-up.pptx
@@ -227,7 +227,7 @@
             <a:fld id="{DDC063FE-8627-9A42-970F-0BBEEB02B587}" type="datetimeFigureOut">
               <a:rPr lang="en-US" smtClean="0"/>
               <a:pPr/>
-              <a:t>11/26/13</a:t>
+              <a:t>11/27/13</a:t>
             </a:fld>
             <a:endParaRPr lang="en-US" dirty="0"/>
           </a:p>
@@ -4955,15 +4955,7 @@
           <a:p>
             <a:r>
               <a:rPr lang="en-US" dirty="0" smtClean="0"/>
-              <a:t>Setting </a:t>
-            </a:r>
-            <a:r>
-              <a:rPr lang="en-US" dirty="0" smtClean="0"/>
-              <a:t>Up to Use th</a:t>
-            </a:r>
-            <a:r>
-              <a:rPr lang="en-US" dirty="0" smtClean="0"/>
-              <a:t>e </a:t>
+              <a:t>Setting Up to Use the </a:t>
             </a:r>
           </a:p>
           <a:p>
@@ -5189,9 +5181,10 @@
           <a:p>
             <a:pPr eaLnBrk="1" hangingPunct="1"/>
             <a:r>
-              <a:rPr lang="en-US" sz="3200" dirty="0"/>
-              <a:t>Brightcove Account</a:t>
-            </a:r>
+              <a:rPr lang="en-US" sz="3200" dirty="0" smtClean="0"/>
+              <a:t>Video Cloud Account</a:t>
+            </a:r>
+            <a:endParaRPr lang="en-US" sz="3200" dirty="0"/>
           </a:p>
           <a:p>
             <a:pPr lvl="1" eaLnBrk="1" hangingPunct="1"/>
@@ -5343,8 +5336,13 @@
           <a:p>
             <a:r>
               <a:rPr lang="en-US" sz="3200" dirty="0" smtClean="0"/>
-              <a:t>The Smart Player API will work with any Brightcove Player</a:t>
-            </a:r>
+              <a:t>The Smart Player API will work with any </a:t>
+            </a:r>
+            <a:r>
+              <a:rPr lang="en-US" sz="3200" dirty="0" smtClean="0"/>
+              <a:t>Video Cloud Player</a:t>
+            </a:r>
+            <a:endParaRPr lang="en-US" sz="3200" dirty="0" smtClean="0"/>
           </a:p>
           <a:p>
             <a:r>
@@ -5459,7 +5457,7 @@
         </p:nvSpPr>
         <p:spPr>
           <a:xfrm>
-            <a:off x="541347" y="1911091"/>
+            <a:off x="541347" y="1583366"/>
             <a:ext cx="10434364" cy="1227624"/>
           </a:xfrm>
         </p:spPr>
@@ -5468,28 +5466,25 @@
           <a:lstStyle/>
           <a:p>
             <a:r>
-              <a:rPr lang="en-US" dirty="0" smtClean="0"/>
+              <a:rPr lang="en-US" sz="3000" dirty="0" smtClean="0"/>
               <a:t>Get the student files and the slides</a:t>
             </a:r>
           </a:p>
           <a:p>
             <a:pPr lvl="1"/>
             <a:r>
-              <a:rPr lang="en-US" dirty="0">
-                <a:hlinkClick r:id="rId2"/>
-              </a:rPr>
-              <a:t>https://github.com/BrightcoveLearning/</a:t>
-            </a:r>
-            <a:r>
-              <a:rPr lang="en-US" dirty="0" smtClean="0">
-                <a:hlinkClick r:id="rId2"/>
-              </a:rPr>
-              <a:t>VideoCloudSmartPlayerAPI</a:t>
-            </a:r>
-            <a:endParaRPr lang="en-US" dirty="0" smtClean="0"/>
-          </a:p>
-          <a:p>
-            <a:endParaRPr lang="en-US" dirty="0"/>
+              <a:rPr lang="en-US" sz="3000" dirty="0"/>
+              <a:t>http://</a:t>
+            </a:r>
+            <a:r>
+              <a:rPr lang="en-US" sz="3000" dirty="0" err="1"/>
+              <a:t>bit.ly</a:t>
+            </a:r>
+            <a:r>
+              <a:rPr lang="en-US" sz="3000" dirty="0"/>
+              <a:t>/1hipNNZ</a:t>
+            </a:r>
+            <a:endParaRPr lang="en-US" sz="3000" dirty="0"/>
           </a:p>
         </p:txBody>
       </p:sp>
@@ -5561,7 +5556,7 @@
           <p:nvPr/>
         </p:nvPicPr>
         <p:blipFill>
-          <a:blip r:embed="rId3">
+          <a:blip r:embed="rId2">
             <a:extLst>
               <a:ext uri="{28A0092B-C50C-407E-A947-70E740481C1C}">
                 <a14:useLocalDpi xmlns:a14="http://schemas.microsoft.com/office/drawing/2010/main" val="0"/>
@@ -5574,7 +5569,7 @@
         </p:blipFill>
         <p:spPr>
           <a:xfrm>
-            <a:off x="1270000" y="2931886"/>
+            <a:off x="1270000" y="2911403"/>
             <a:ext cx="8943760" cy="6198735"/>
           </a:xfrm>
           <a:prstGeom prst="rect">

</xml_diff>